<commit_message>
Updated ppt and results for our LSTM
</commit_message>
<xml_diff>
--- a/Tutorial-3-Presentation.pptx
+++ b/Tutorial-3-Presentation.pptx
@@ -125,7 +125,7 @@
 <file path=ppt/charts/chart1.xml><?xml version="1.0" encoding="utf-8"?>
 <c:chartSpace xmlns:c="http://schemas.openxmlformats.org/drawingml/2006/chart" xmlns:a="http://schemas.openxmlformats.org/drawingml/2006/main" xmlns:r="http://schemas.openxmlformats.org/officeDocument/2006/relationships" xmlns:c16r2="http://schemas.microsoft.com/office/drawing/2015/06/chart">
   <c:date1904 val="0"/>
-  <c:lang val="en-US"/>
+  <c:lang val="fr-FR"/>
   <c:roundedCorners val="0"/>
   <mc:AlternateContent xmlns:mc="http://schemas.openxmlformats.org/markup-compatibility/2006">
     <mc:Choice xmlns:c14="http://schemas.microsoft.com/office/drawing/2007/8/2/chart" Requires="c14">
@@ -138,17 +138,7 @@
   <c:chart>
     <c:autoTitleDeleted val="0"/>
     <c:plotArea>
-      <c:layout>
-        <c:manualLayout>
-          <c:layoutTarget val="inner"/>
-          <c:xMode val="edge"/>
-          <c:yMode val="edge"/>
-          <c:x val="0.25948840769903775"/>
-          <c:y val="7.4548702245552642E-2"/>
-          <c:w val="0.73901290463692038"/>
-          <c:h val="0.68109580052493446"/>
-        </c:manualLayout>
-      </c:layout>
+      <c:layout/>
       <c:barChart>
         <c:barDir val="col"/>
         <c:grouping val="clustered"/>
@@ -158,7 +148,7 @@
           <c:order val="0"/>
           <c:tx>
             <c:strRef>
-              <c:f>'[A3 diagrasms (version 1).xlsb]Feuil1'!$A$4</c:f>
+              <c:f>'[A3 diagrasms.xlsx]Feuil1'!$A$4</c:f>
               <c:strCache>
                 <c:ptCount val="1"/>
                 <c:pt idx="0">
@@ -173,9 +163,310 @@
             </a:solidFill>
           </c:spPr>
           <c:invertIfNegative val="0"/>
+          <c:val>
+            <c:numRef>
+              <c:f>'[A3 diagrasms.xlsx]Feuil1'!$B$4:$H$4</c:f>
+              <c:numCache>
+                <c:formatCode>General</c:formatCode>
+                <c:ptCount val="7"/>
+                <c:pt idx="0">
+                  <c:v>78.180000000000007</c:v>
+                </c:pt>
+                <c:pt idx="1">
+                  <c:v>78.38</c:v>
+                </c:pt>
+                <c:pt idx="2">
+                  <c:v>77.78</c:v>
+                </c:pt>
+                <c:pt idx="3">
+                  <c:v>87.88</c:v>
+                </c:pt>
+                <c:pt idx="4">
+                  <c:v>63.64</c:v>
+                </c:pt>
+                <c:pt idx="5">
+                  <c:v>82.86</c:v>
+                </c:pt>
+                <c:pt idx="6">
+                  <c:v>70</c:v>
+                </c:pt>
+              </c:numCache>
+            </c:numRef>
+          </c:val>
+          <c:extLst>
+            <c:ext xmlns:c16="http://schemas.microsoft.com/office/drawing/2014/chart" uri="{C3380CC4-5D6E-409C-BE32-E72D297353CC}">
+              <c16:uniqueId val="{00000000-3501-4864-9E9F-B6BDF9680614}"/>
+            </c:ext>
+          </c:extLst>
+        </c:ser>
+        <c:ser>
+          <c:idx val="1"/>
+          <c:order val="1"/>
+          <c:tx>
+            <c:strRef>
+              <c:f>'[A3 diagrasms.xlsx]Feuil1'!$A$5</c:f>
+              <c:strCache>
+                <c:ptCount val="1"/>
+                <c:pt idx="0">
+                  <c:v>LSTM 2</c:v>
+                </c:pt>
+              </c:strCache>
+            </c:strRef>
+          </c:tx>
+          <c:spPr>
+            <a:solidFill>
+              <a:srgbClr val="0070C0"/>
+            </a:solidFill>
+          </c:spPr>
+          <c:invertIfNegative val="0"/>
+          <c:val>
+            <c:numRef>
+              <c:f>'[A3 diagrasms.xlsx]Feuil1'!$B$5:$H$5</c:f>
+              <c:numCache>
+                <c:formatCode>General</c:formatCode>
+                <c:ptCount val="7"/>
+                <c:pt idx="0">
+                  <c:v>72.73</c:v>
+                </c:pt>
+                <c:pt idx="1">
+                  <c:v>71.430000000000007</c:v>
+                </c:pt>
+                <c:pt idx="2">
+                  <c:v>76.92</c:v>
+                </c:pt>
+                <c:pt idx="3">
+                  <c:v>90.91</c:v>
+                </c:pt>
+                <c:pt idx="4">
+                  <c:v>45.45</c:v>
+                </c:pt>
+                <c:pt idx="5">
+                  <c:v>80</c:v>
+                </c:pt>
+                <c:pt idx="6">
+                  <c:v>57.14</c:v>
+                </c:pt>
+              </c:numCache>
+            </c:numRef>
+          </c:val>
+          <c:extLst>
+            <c:ext xmlns:c16="http://schemas.microsoft.com/office/drawing/2014/chart" uri="{C3380CC4-5D6E-409C-BE32-E72D297353CC}">
+              <c16:uniqueId val="{00000001-3501-4864-9E9F-B6BDF9680614}"/>
+            </c:ext>
+          </c:extLst>
+        </c:ser>
+        <c:ser>
+          <c:idx val="2"/>
+          <c:order val="2"/>
+          <c:tx>
+            <c:strRef>
+              <c:f>'[A3 diagrasms.xlsx]Feuil1'!$A$6</c:f>
+              <c:strCache>
+                <c:ptCount val="1"/>
+                <c:pt idx="0">
+                  <c:v>LSTM 3</c:v>
+                </c:pt>
+              </c:strCache>
+            </c:strRef>
+          </c:tx>
+          <c:spPr>
+            <a:solidFill>
+              <a:srgbClr val="FF0000"/>
+            </a:solidFill>
+          </c:spPr>
+          <c:invertIfNegative val="0"/>
+          <c:val>
+            <c:numRef>
+              <c:f>'[A3 diagrasms.xlsx]Feuil1'!$B$6:$H$6</c:f>
+              <c:numCache>
+                <c:formatCode>General</c:formatCode>
+                <c:ptCount val="7"/>
+                <c:pt idx="0">
+                  <c:v>60</c:v>
+                </c:pt>
+                <c:pt idx="1">
+                  <c:v>61.17</c:v>
+                </c:pt>
+                <c:pt idx="2">
+                  <c:v>50</c:v>
+                </c:pt>
+                <c:pt idx="3">
+                  <c:v>87.88</c:v>
+                </c:pt>
+                <c:pt idx="4">
+                  <c:v>18.18</c:v>
+                </c:pt>
+                <c:pt idx="5">
+                  <c:v>72.5</c:v>
+                </c:pt>
+                <c:pt idx="6">
+                  <c:v>26.67</c:v>
+                </c:pt>
+              </c:numCache>
+            </c:numRef>
+          </c:val>
+          <c:extLst>
+            <c:ext xmlns:c16="http://schemas.microsoft.com/office/drawing/2014/chart" uri="{C3380CC4-5D6E-409C-BE32-E72D297353CC}">
+              <c16:uniqueId val="{00000002-3501-4864-9E9F-B6BDF9680614}"/>
+            </c:ext>
+          </c:extLst>
+        </c:ser>
+        <c:ser>
+          <c:idx val="3"/>
+          <c:order val="3"/>
+          <c:tx>
+            <c:strRef>
+              <c:f>'[A3 diagrasms.xlsx]Feuil1'!$B$1</c:f>
+              <c:strCache>
+                <c:ptCount val="1"/>
+                <c:pt idx="0">
+                  <c:v>ACC</c:v>
+                </c:pt>
+              </c:strCache>
+            </c:strRef>
+          </c:tx>
+          <c:invertIfNegative val="0"/>
+          <c:val>
+            <c:numRef>
+              <c:f>'[A3 diagrasms.xlsx]Feuil1'!$C$1:$H$1</c:f>
+              <c:numCache>
+                <c:formatCode>General</c:formatCode>
+                <c:ptCount val="6"/>
+                <c:pt idx="0">
+                  <c:v>0</c:v>
+                </c:pt>
+                <c:pt idx="1">
+                  <c:v>0</c:v>
+                </c:pt>
+                <c:pt idx="2">
+                  <c:v>0</c:v>
+                </c:pt>
+                <c:pt idx="3">
+                  <c:v>0</c:v>
+                </c:pt>
+                <c:pt idx="4">
+                  <c:v>0</c:v>
+                </c:pt>
+                <c:pt idx="5">
+                  <c:v>0</c:v>
+                </c:pt>
+              </c:numCache>
+            </c:numRef>
+          </c:val>
+          <c:extLst>
+            <c:ext xmlns:c16="http://schemas.microsoft.com/office/drawing/2014/chart" uri="{C3380CC4-5D6E-409C-BE32-E72D297353CC}">
+              <c16:uniqueId val="{00000003-3501-4864-9E9F-B6BDF9680614}"/>
+            </c:ext>
+          </c:extLst>
+        </c:ser>
+        <c:dLbls>
+          <c:showLegendKey val="0"/>
+          <c:showVal val="0"/>
+          <c:showCatName val="0"/>
+          <c:showSerName val="0"/>
+          <c:showPercent val="0"/>
+          <c:showBubbleSize val="0"/>
+        </c:dLbls>
+        <c:gapWidth val="150"/>
+        <c:axId val="47941504"/>
+        <c:axId val="47943680"/>
+      </c:barChart>
+      <c:catAx>
+        <c:axId val="47941504"/>
+        <c:scaling>
+          <c:orientation val="minMax"/>
+        </c:scaling>
+        <c:delete val="0"/>
+        <c:axPos val="b"/>
+        <c:majorTickMark val="out"/>
+        <c:minorTickMark val="none"/>
+        <c:tickLblPos val="nextTo"/>
+        <c:crossAx val="47943680"/>
+        <c:crosses val="autoZero"/>
+        <c:auto val="1"/>
+        <c:lblAlgn val="ctr"/>
+        <c:lblOffset val="100"/>
+        <c:noMultiLvlLbl val="0"/>
+      </c:catAx>
+      <c:valAx>
+        <c:axId val="47943680"/>
+        <c:scaling>
+          <c:orientation val="minMax"/>
+        </c:scaling>
+        <c:delete val="0"/>
+        <c:axPos val="l"/>
+        <c:majorGridlines/>
+        <c:numFmt formatCode="General" sourceLinked="1"/>
+        <c:majorTickMark val="out"/>
+        <c:minorTickMark val="none"/>
+        <c:tickLblPos val="nextTo"/>
+        <c:crossAx val="47941504"/>
+        <c:crosses val="autoZero"/>
+        <c:crossBetween val="between"/>
+      </c:valAx>
+    </c:plotArea>
+    <c:legend>
+      <c:legendPos val="r"/>
+      <c:legendEntry>
+        <c:idx val="3"/>
+        <c:delete val="1"/>
+      </c:legendEntry>
+      <c:overlay val="0"/>
+    </c:legend>
+    <c:plotVisOnly val="1"/>
+    <c:dispBlanksAs val="gap"/>
+    <c:showDLblsOverMax val="0"/>
+  </c:chart>
+  <c:externalData r:id="rId1">
+    <c:autoUpdate val="0"/>
+  </c:externalData>
+</c:chartSpace>
+</file>
+
+<file path=ppt/charts/chart2.xml><?xml version="1.0" encoding="utf-8"?>
+<c:chartSpace xmlns:c="http://schemas.openxmlformats.org/drawingml/2006/chart" xmlns:a="http://schemas.openxmlformats.org/drawingml/2006/main" xmlns:r="http://schemas.openxmlformats.org/officeDocument/2006/relationships" xmlns:c16r2="http://schemas.microsoft.com/office/drawing/2015/06/chart">
+  <c:date1904 val="0"/>
+  <c:lang val="fr-FR"/>
+  <c:roundedCorners val="0"/>
+  <mc:AlternateContent xmlns:mc="http://schemas.openxmlformats.org/markup-compatibility/2006">
+    <mc:Choice xmlns:c14="http://schemas.microsoft.com/office/drawing/2007/8/2/chart" Requires="c14">
+      <c14:style val="102"/>
+    </mc:Choice>
+    <mc:Fallback>
+      <c:style val="2"/>
+    </mc:Fallback>
+  </mc:AlternateContent>
+  <c:chart>
+    <c:autoTitleDeleted val="0"/>
+    <c:plotArea>
+      <c:layout/>
+      <c:barChart>
+        <c:barDir val="col"/>
+        <c:grouping val="clustered"/>
+        <c:varyColors val="0"/>
+        <c:ser>
+          <c:idx val="0"/>
+          <c:order val="0"/>
+          <c:tx>
+            <c:strRef>
+              <c:f>'[A3 diagrasms.xlsx]Feuil1'!$A$2</c:f>
+              <c:strCache>
+                <c:ptCount val="1"/>
+                <c:pt idx="0">
+                  <c:v>NB-BOW-OV</c:v>
+                </c:pt>
+              </c:strCache>
+            </c:strRef>
+          </c:tx>
+          <c:spPr>
+            <a:solidFill>
+              <a:srgbClr val="00B050"/>
+            </a:solidFill>
+          </c:spPr>
+          <c:invertIfNegative val="0"/>
           <c:cat>
             <c:strRef>
-              <c:f>'[A3 diagrasms (version 1).xlsb]Feuil1'!$B$1:$H$1</c:f>
+              <c:f>'[A3 diagrasms.xlsx]Feuil1'!$B$1,'[A3 diagrasms.xlsx]Feuil1'!$C$1,'[A3 diagrasms.xlsx]Feuil1'!$D$1,'[A3 diagrasms.xlsx]Feuil1'!$E$1,'[A3 diagrasms.xlsx]Feuil1'!$F$1,'[A3 diagrasms.xlsx]Feuil1'!$G$1,'[A3 diagrasms.xlsx]Feuil1'!$H$1</c:f>
               <c:strCache>
                 <c:ptCount val="7"/>
                 <c:pt idx="0">
@@ -204,354 +495,7 @@
           </c:cat>
           <c:val>
             <c:numRef>
-              <c:f>'[A3 diagrasms (version 1).xlsb]Feuil1'!$B$4:$H$4</c:f>
-              <c:numCache>
-                <c:formatCode>General</c:formatCode>
-                <c:ptCount val="7"/>
-                <c:pt idx="0">
-                  <c:v>70.37</c:v>
-                </c:pt>
-                <c:pt idx="1">
-                  <c:v>81.48</c:v>
-                </c:pt>
-                <c:pt idx="2">
-                  <c:v>18.52</c:v>
-                </c:pt>
-                <c:pt idx="3">
-                  <c:v>66.67</c:v>
-                </c:pt>
-                <c:pt idx="4">
-                  <c:v>23.81</c:v>
-                </c:pt>
-                <c:pt idx="5">
-                  <c:v>73.33</c:v>
-                </c:pt>
-                <c:pt idx="6">
-                  <c:v>20.83</c:v>
-                </c:pt>
-              </c:numCache>
-            </c:numRef>
-          </c:val>
-          <c:extLst>
-            <c:ext xmlns:c16="http://schemas.microsoft.com/office/drawing/2014/chart" uri="{C3380CC4-5D6E-409C-BE32-E72D297353CC}">
-              <c16:uniqueId val="{00000000-2D7E-41A1-BE6F-1B177EC54455}"/>
-            </c:ext>
-          </c:extLst>
-        </c:ser>
-        <c:ser>
-          <c:idx val="1"/>
-          <c:order val="1"/>
-          <c:tx>
-            <c:strRef>
-              <c:f>'[A3 diagrasms (version 1).xlsb]Feuil1'!$A$5</c:f>
-              <c:strCache>
-                <c:ptCount val="1"/>
-                <c:pt idx="0">
-                  <c:v>LSTM 2</c:v>
-                </c:pt>
-              </c:strCache>
-            </c:strRef>
-          </c:tx>
-          <c:spPr>
-            <a:solidFill>
-              <a:srgbClr val="0070C0"/>
-            </a:solidFill>
-          </c:spPr>
-          <c:invertIfNegative val="0"/>
-          <c:cat>
-            <c:strRef>
-              <c:f>'[A3 diagrasms (version 1).xlsb]Feuil1'!$B$1:$H$1</c:f>
-              <c:strCache>
-                <c:ptCount val="7"/>
-                <c:pt idx="0">
-                  <c:v>ACC</c:v>
-                </c:pt>
-                <c:pt idx="1">
-                  <c:v>YES-Prec</c:v>
-                </c:pt>
-                <c:pt idx="2">
-                  <c:v>No-Prec</c:v>
-                </c:pt>
-                <c:pt idx="3">
-                  <c:v>Yes-Recall</c:v>
-                </c:pt>
-                <c:pt idx="4">
-                  <c:v>No-Recall</c:v>
-                </c:pt>
-                <c:pt idx="5">
-                  <c:v>Yes-F1</c:v>
-                </c:pt>
-                <c:pt idx="6">
-                  <c:v>No-F1</c:v>
-                </c:pt>
-              </c:strCache>
-            </c:strRef>
-          </c:cat>
-          <c:val>
-            <c:numRef>
-              <c:f>'[A3 diagrasms (version 1).xlsb]Feuil1'!$B$5:$H$5</c:f>
-              <c:numCache>
-                <c:formatCode>General</c:formatCode>
-                <c:ptCount val="7"/>
-                <c:pt idx="0">
-                  <c:v>75.930000000000007</c:v>
-                </c:pt>
-                <c:pt idx="1">
-                  <c:v>77.78</c:v>
-                </c:pt>
-                <c:pt idx="2">
-                  <c:v>22.22</c:v>
-                </c:pt>
-                <c:pt idx="3">
-                  <c:v>84.85</c:v>
-                </c:pt>
-                <c:pt idx="4">
-                  <c:v>38.1</c:v>
-                </c:pt>
-                <c:pt idx="5">
-                  <c:v>81.16</c:v>
-                </c:pt>
-                <c:pt idx="6">
-                  <c:v>28.07</c:v>
-                </c:pt>
-              </c:numCache>
-            </c:numRef>
-          </c:val>
-          <c:extLst>
-            <c:ext xmlns:c16="http://schemas.microsoft.com/office/drawing/2014/chart" uri="{C3380CC4-5D6E-409C-BE32-E72D297353CC}">
-              <c16:uniqueId val="{00000001-2D7E-41A1-BE6F-1B177EC54455}"/>
-            </c:ext>
-          </c:extLst>
-        </c:ser>
-        <c:ser>
-          <c:idx val="2"/>
-          <c:order val="2"/>
-          <c:tx>
-            <c:strRef>
-              <c:f>'[A3 diagrasms (version 1).xlsb]Feuil1'!$A$6</c:f>
-              <c:strCache>
-                <c:ptCount val="1"/>
-                <c:pt idx="0">
-                  <c:v>LSTM 3</c:v>
-                </c:pt>
-              </c:strCache>
-            </c:strRef>
-          </c:tx>
-          <c:spPr>
-            <a:solidFill>
-              <a:srgbClr val="FF0000"/>
-            </a:solidFill>
-          </c:spPr>
-          <c:invertIfNegative val="0"/>
-          <c:cat>
-            <c:strRef>
-              <c:f>'[A3 diagrasms (version 1).xlsb]Feuil1'!$B$1:$H$1</c:f>
-              <c:strCache>
-                <c:ptCount val="7"/>
-                <c:pt idx="0">
-                  <c:v>ACC</c:v>
-                </c:pt>
-                <c:pt idx="1">
-                  <c:v>YES-Prec</c:v>
-                </c:pt>
-                <c:pt idx="2">
-                  <c:v>No-Prec</c:v>
-                </c:pt>
-                <c:pt idx="3">
-                  <c:v>Yes-Recall</c:v>
-                </c:pt>
-                <c:pt idx="4">
-                  <c:v>No-Recall</c:v>
-                </c:pt>
-                <c:pt idx="5">
-                  <c:v>Yes-F1</c:v>
-                </c:pt>
-                <c:pt idx="6">
-                  <c:v>No-F1</c:v>
-                </c:pt>
-              </c:strCache>
-            </c:strRef>
-          </c:cat>
-          <c:val>
-            <c:numRef>
-              <c:f>'[A3 diagrasms (version 1).xlsb]Feuil1'!$B$6:$H$6</c:f>
-              <c:numCache>
-                <c:formatCode>General</c:formatCode>
-                <c:ptCount val="7"/>
-                <c:pt idx="0">
-                  <c:v>61.11</c:v>
-                </c:pt>
-                <c:pt idx="1">
-                  <c:v>70</c:v>
-                </c:pt>
-                <c:pt idx="2">
-                  <c:v>30</c:v>
-                </c:pt>
-                <c:pt idx="3">
-                  <c:v>63.64</c:v>
-                </c:pt>
-                <c:pt idx="4">
-                  <c:v>42.86</c:v>
-                </c:pt>
-                <c:pt idx="5">
-                  <c:v>66.67</c:v>
-                </c:pt>
-                <c:pt idx="6">
-                  <c:v>35.29</c:v>
-                </c:pt>
-              </c:numCache>
-            </c:numRef>
-          </c:val>
-          <c:extLst>
-            <c:ext xmlns:c16="http://schemas.microsoft.com/office/drawing/2014/chart" uri="{C3380CC4-5D6E-409C-BE32-E72D297353CC}">
-              <c16:uniqueId val="{00000002-2D7E-41A1-BE6F-1B177EC54455}"/>
-            </c:ext>
-          </c:extLst>
-        </c:ser>
-        <c:dLbls>
-          <c:showLegendKey val="0"/>
-          <c:showVal val="0"/>
-          <c:showCatName val="0"/>
-          <c:showSerName val="0"/>
-          <c:showPercent val="0"/>
-          <c:showBubbleSize val="0"/>
-        </c:dLbls>
-        <c:gapWidth val="150"/>
-        <c:axId val="92851584"/>
-        <c:axId val="92882048"/>
-      </c:barChart>
-      <c:catAx>
-        <c:axId val="92851584"/>
-        <c:scaling>
-          <c:orientation val="minMax"/>
-        </c:scaling>
-        <c:delete val="0"/>
-        <c:axPos val="b"/>
-        <c:numFmt formatCode="General" sourceLinked="0"/>
-        <c:majorTickMark val="out"/>
-        <c:minorTickMark val="none"/>
-        <c:tickLblPos val="nextTo"/>
-        <c:crossAx val="92882048"/>
-        <c:crosses val="autoZero"/>
-        <c:auto val="1"/>
-        <c:lblAlgn val="ctr"/>
-        <c:lblOffset val="100"/>
-        <c:noMultiLvlLbl val="0"/>
-      </c:catAx>
-      <c:valAx>
-        <c:axId val="92882048"/>
-        <c:scaling>
-          <c:orientation val="minMax"/>
-        </c:scaling>
-        <c:delete val="0"/>
-        <c:axPos val="l"/>
-        <c:majorGridlines/>
-        <c:numFmt formatCode="General" sourceLinked="1"/>
-        <c:majorTickMark val="out"/>
-        <c:minorTickMark val="none"/>
-        <c:tickLblPos val="nextTo"/>
-        <c:crossAx val="92851584"/>
-        <c:crosses val="autoZero"/>
-        <c:crossBetween val="between"/>
-      </c:valAx>
-    </c:plotArea>
-    <c:legend>
-      <c:legendPos val="r"/>
-      <c:layout>
-        <c:manualLayout>
-          <c:xMode val="edge"/>
-          <c:yMode val="edge"/>
-          <c:x val="7.2353526659370032E-2"/>
-          <c:y val="0.32812773403324591"/>
-          <c:w val="8.374183996231245E-2"/>
-          <c:h val="0.25115157480314959"/>
-        </c:manualLayout>
-      </c:layout>
-      <c:overlay val="0"/>
-    </c:legend>
-    <c:plotVisOnly val="1"/>
-    <c:dispBlanksAs val="gap"/>
-    <c:showDLblsOverMax val="0"/>
-  </c:chart>
-  <c:externalData r:id="rId1">
-    <c:autoUpdate val="0"/>
-  </c:externalData>
-</c:chartSpace>
-</file>
-
-<file path=ppt/charts/chart2.xml><?xml version="1.0" encoding="utf-8"?>
-<c:chartSpace xmlns:c="http://schemas.openxmlformats.org/drawingml/2006/chart" xmlns:a="http://schemas.openxmlformats.org/drawingml/2006/main" xmlns:r="http://schemas.openxmlformats.org/officeDocument/2006/relationships" xmlns:c16r2="http://schemas.microsoft.com/office/drawing/2015/06/chart">
-  <c:date1904 val="0"/>
-  <c:lang val="en-US"/>
-  <c:roundedCorners val="0"/>
-  <mc:AlternateContent xmlns:mc="http://schemas.openxmlformats.org/markup-compatibility/2006">
-    <mc:Choice xmlns:c14="http://schemas.microsoft.com/office/drawing/2007/8/2/chart" Requires="c14">
-      <c14:style val="102"/>
-    </mc:Choice>
-    <mc:Fallback>
-      <c:style val="2"/>
-    </mc:Fallback>
-  </mc:AlternateContent>
-  <c:chart>
-    <c:autoTitleDeleted val="0"/>
-    <c:plotArea>
-      <c:layout/>
-      <c:barChart>
-        <c:barDir val="col"/>
-        <c:grouping val="clustered"/>
-        <c:varyColors val="0"/>
-        <c:ser>
-          <c:idx val="0"/>
-          <c:order val="0"/>
-          <c:tx>
-            <c:strRef>
-              <c:f>[Classeur1]Feuil1!$A$2</c:f>
-              <c:strCache>
-                <c:ptCount val="1"/>
-                <c:pt idx="0">
-                  <c:v>NB-BOW-OV</c:v>
-                </c:pt>
-              </c:strCache>
-            </c:strRef>
-          </c:tx>
-          <c:spPr>
-            <a:solidFill>
-              <a:srgbClr val="00B050"/>
-            </a:solidFill>
-          </c:spPr>
-          <c:invertIfNegative val="0"/>
-          <c:cat>
-            <c:strRef>
-              <c:f>[Classeur1]Feuil1!$B$1:$H$1</c:f>
-              <c:strCache>
-                <c:ptCount val="7"/>
-                <c:pt idx="0">
-                  <c:v>ACC</c:v>
-                </c:pt>
-                <c:pt idx="1">
-                  <c:v>YES-Prec</c:v>
-                </c:pt>
-                <c:pt idx="2">
-                  <c:v>No-Prec</c:v>
-                </c:pt>
-                <c:pt idx="3">
-                  <c:v>Yes-Recall</c:v>
-                </c:pt>
-                <c:pt idx="4">
-                  <c:v>No-Recall</c:v>
-                </c:pt>
-                <c:pt idx="5">
-                  <c:v>Yes-F1</c:v>
-                </c:pt>
-                <c:pt idx="6">
-                  <c:v>No-F1</c:v>
-                </c:pt>
-              </c:strCache>
-            </c:strRef>
-          </c:cat>
-          <c:val>
-            <c:numRef>
-              <c:f>[Classeur1]Feuil1!$B$2:$H$2</c:f>
+              <c:f>'[A3 diagrasms.xlsx]Feuil1'!$B$2:$H$2</c:f>
               <c:numCache>
                 <c:formatCode>General</c:formatCode>
                 <c:ptCount val="7"/>
@@ -581,7 +525,7 @@
           </c:val>
           <c:extLst>
             <c:ext xmlns:c16="http://schemas.microsoft.com/office/drawing/2014/chart" uri="{C3380CC4-5D6E-409C-BE32-E72D297353CC}">
-              <c16:uniqueId val="{00000000-E729-4F48-89F8-E6C12407E372}"/>
+              <c16:uniqueId val="{00000000-D392-4A6B-AEC8-92A96B25E5FB}"/>
             </c:ext>
           </c:extLst>
         </c:ser>
@@ -590,7 +534,7 @@
           <c:order val="1"/>
           <c:tx>
             <c:strRef>
-              <c:f>[Classeur1]Feuil1!$A$3</c:f>
+              <c:f>'[A3 diagrasms.xlsx]Feuil1'!$A$3</c:f>
               <c:strCache>
                 <c:ptCount val="1"/>
                 <c:pt idx="0">
@@ -607,7 +551,7 @@
           <c:invertIfNegative val="0"/>
           <c:cat>
             <c:strRef>
-              <c:f>[Classeur1]Feuil1!$B$1:$H$1</c:f>
+              <c:f>'[A3 diagrasms.xlsx]Feuil1'!$B$1,'[A3 diagrasms.xlsx]Feuil1'!$C$1,'[A3 diagrasms.xlsx]Feuil1'!$D$1,'[A3 diagrasms.xlsx]Feuil1'!$E$1,'[A3 diagrasms.xlsx]Feuil1'!$F$1,'[A3 diagrasms.xlsx]Feuil1'!$G$1,'[A3 diagrasms.xlsx]Feuil1'!$H$1</c:f>
               <c:strCache>
                 <c:ptCount val="7"/>
                 <c:pt idx="0">
@@ -636,7 +580,7 @@
           </c:cat>
           <c:val>
             <c:numRef>
-              <c:f>[Classeur1]Feuil1!$B$3:$H$3</c:f>
+              <c:f>'[A3 diagrasms.xlsx]Feuil1'!$B$3:$H$3</c:f>
               <c:numCache>
                 <c:formatCode>General</c:formatCode>
                 <c:ptCount val="7"/>
@@ -666,7 +610,7 @@
           </c:val>
           <c:extLst>
             <c:ext xmlns:c16="http://schemas.microsoft.com/office/drawing/2014/chart" uri="{C3380CC4-5D6E-409C-BE32-E72D297353CC}">
-              <c16:uniqueId val="{00000001-E729-4F48-89F8-E6C12407E372}"/>
+              <c16:uniqueId val="{00000001-D392-4A6B-AEC8-92A96B25E5FB}"/>
             </c:ext>
           </c:extLst>
         </c:ser>
@@ -675,11 +619,11 @@
           <c:order val="2"/>
           <c:tx>
             <c:strRef>
-              <c:f>[Classeur1]Feuil1!$A$4</c:f>
+              <c:f>'[A3 diagrasms.xlsx]Feuil1'!$A$4</c:f>
               <c:strCache>
                 <c:ptCount val="1"/>
                 <c:pt idx="0">
-                  <c:v>LSTM</c:v>
+                  <c:v>LSTM 1</c:v>
                 </c:pt>
               </c:strCache>
             </c:strRef>
@@ -692,7 +636,7 @@
           <c:invertIfNegative val="0"/>
           <c:cat>
             <c:strRef>
-              <c:f>[Classeur1]Feuil1!$B$1:$H$1</c:f>
+              <c:f>'[A3 diagrasms.xlsx]Feuil1'!$B$1,'[A3 diagrasms.xlsx]Feuil1'!$C$1,'[A3 diagrasms.xlsx]Feuil1'!$D$1,'[A3 diagrasms.xlsx]Feuil1'!$E$1,'[A3 diagrasms.xlsx]Feuil1'!$F$1,'[A3 diagrasms.xlsx]Feuil1'!$G$1,'[A3 diagrasms.xlsx]Feuil1'!$H$1</c:f>
               <c:strCache>
                 <c:ptCount val="7"/>
                 <c:pt idx="0">
@@ -721,37 +665,37 @@
           </c:cat>
           <c:val>
             <c:numRef>
-              <c:f>[Classeur1]Feuil1!$B$4:$H$4</c:f>
+              <c:f>'[A3 diagrasms.xlsx]Feuil1'!$B$4:$H$4</c:f>
               <c:numCache>
                 <c:formatCode>General</c:formatCode>
                 <c:ptCount val="7"/>
                 <c:pt idx="0">
-                  <c:v>70.37</c:v>
+                  <c:v>78.180000000000007</c:v>
                 </c:pt>
                 <c:pt idx="1">
-                  <c:v>81.48</c:v>
+                  <c:v>78.38</c:v>
                 </c:pt>
                 <c:pt idx="2">
-                  <c:v>18.52</c:v>
+                  <c:v>77.78</c:v>
                 </c:pt>
                 <c:pt idx="3">
-                  <c:v>66.67</c:v>
+                  <c:v>87.88</c:v>
                 </c:pt>
                 <c:pt idx="4">
-                  <c:v>23.81</c:v>
+                  <c:v>63.64</c:v>
                 </c:pt>
                 <c:pt idx="5">
-                  <c:v>73.33</c:v>
+                  <c:v>82.86</c:v>
                 </c:pt>
                 <c:pt idx="6">
-                  <c:v>20.83</c:v>
+                  <c:v>70</c:v>
                 </c:pt>
               </c:numCache>
             </c:numRef>
           </c:val>
           <c:extLst>
             <c:ext xmlns:c16="http://schemas.microsoft.com/office/drawing/2014/chart" uri="{C3380CC4-5D6E-409C-BE32-E72D297353CC}">
-              <c16:uniqueId val="{00000002-E729-4F48-89F8-E6C12407E372}"/>
+              <c16:uniqueId val="{00000002-D392-4A6B-AEC8-92A96B25E5FB}"/>
             </c:ext>
           </c:extLst>
         </c:ser>
@@ -764,11 +708,11 @@
           <c:showBubbleSize val="0"/>
         </c:dLbls>
         <c:gapWidth val="150"/>
-        <c:axId val="70369664"/>
-        <c:axId val="70371200"/>
+        <c:axId val="99605120"/>
+        <c:axId val="99606912"/>
       </c:barChart>
       <c:catAx>
-        <c:axId val="70369664"/>
+        <c:axId val="99605120"/>
         <c:scaling>
           <c:orientation val="minMax"/>
         </c:scaling>
@@ -778,7 +722,7 @@
         <c:majorTickMark val="out"/>
         <c:minorTickMark val="none"/>
         <c:tickLblPos val="nextTo"/>
-        <c:crossAx val="70371200"/>
+        <c:crossAx val="99606912"/>
         <c:crosses val="autoZero"/>
         <c:auto val="1"/>
         <c:lblAlgn val="ctr"/>
@@ -786,7 +730,7 @@
         <c:noMultiLvlLbl val="0"/>
       </c:catAx>
       <c:valAx>
-        <c:axId val="70371200"/>
+        <c:axId val="99606912"/>
         <c:scaling>
           <c:orientation val="minMax"/>
         </c:scaling>
@@ -797,7 +741,7 @@
         <c:majorTickMark val="out"/>
         <c:minorTickMark val="none"/>
         <c:tickLblPos val="nextTo"/>
-        <c:crossAx val="70369664"/>
+        <c:crossAx val="99605120"/>
         <c:crosses val="autoZero"/>
         <c:crossBetween val="between"/>
       </c:valAx>
@@ -1462,7 +1406,7 @@
           <a:p>
             <a:fld id="{37199DC3-2230-41CD-8CF6-0CD3B14F7518}" type="datetimeFigureOut">
               <a:rPr lang="en-US" smtClean="0"/>
-              <a:t>12/12/2020</a:t>
+              <a:t>13-Dec-20</a:t>
             </a:fld>
             <a:endParaRPr lang="en-US"/>
           </a:p>
@@ -1564,7 +1508,7 @@
           <a:p>
             <a:fld id="{1D4DF9BF-9932-43C7-892F-C03C1335E0EA}" type="slidenum">
               <a:rPr lang="en-US" smtClean="0"/>
-              <a:t>‹#›</a:t>
+              <a:t>‹N°›</a:t>
             </a:fld>
             <a:endParaRPr lang="en-US"/>
           </a:p>
@@ -2582,7 +2526,7 @@
           <a:p>
             <a:fld id="{37199DC3-2230-41CD-8CF6-0CD3B14F7518}" type="datetimeFigureOut">
               <a:rPr lang="en-US" smtClean="0"/>
-              <a:t>12/12/2020</a:t>
+              <a:t>13-Dec-20</a:t>
             </a:fld>
             <a:endParaRPr lang="en-US"/>
           </a:p>
@@ -2660,7 +2604,7 @@
           <a:p>
             <a:fld id="{1D4DF9BF-9932-43C7-892F-C03C1335E0EA}" type="slidenum">
               <a:rPr lang="en-US" smtClean="0"/>
-              <a:t>‹#›</a:t>
+              <a:t>‹N°›</a:t>
             </a:fld>
             <a:endParaRPr lang="en-US"/>
           </a:p>
@@ -3593,7 +3537,7 @@
           <a:p>
             <a:fld id="{37199DC3-2230-41CD-8CF6-0CD3B14F7518}" type="datetimeFigureOut">
               <a:rPr lang="en-US" smtClean="0"/>
-              <a:t>12/12/2020</a:t>
+              <a:t>13-Dec-20</a:t>
             </a:fld>
             <a:endParaRPr lang="en-US"/>
           </a:p>
@@ -3671,7 +3615,7 @@
           <a:p>
             <a:fld id="{1D4DF9BF-9932-43C7-892F-C03C1335E0EA}" type="slidenum">
               <a:rPr lang="en-US" smtClean="0"/>
-              <a:t>‹#›</a:t>
+              <a:t>‹N°›</a:t>
             </a:fld>
             <a:endParaRPr lang="en-US"/>
           </a:p>
@@ -4763,7 +4707,7 @@
           <a:p>
             <a:fld id="{37199DC3-2230-41CD-8CF6-0CD3B14F7518}" type="datetimeFigureOut">
               <a:rPr lang="en-US" smtClean="0"/>
-              <a:t>12/12/2020</a:t>
+              <a:t>13-Dec-20</a:t>
             </a:fld>
             <a:endParaRPr lang="en-US"/>
           </a:p>
@@ -4841,7 +4785,7 @@
           <a:p>
             <a:fld id="{1D4DF9BF-9932-43C7-892F-C03C1335E0EA}" type="slidenum">
               <a:rPr lang="en-US" smtClean="0"/>
-              <a:t>‹#›</a:t>
+              <a:t>‹N°›</a:t>
             </a:fld>
             <a:endParaRPr lang="en-US"/>
           </a:p>
@@ -5824,7 +5768,7 @@
           <a:p>
             <a:fld id="{37199DC3-2230-41CD-8CF6-0CD3B14F7518}" type="datetimeFigureOut">
               <a:rPr lang="en-US" smtClean="0"/>
-              <a:t>12/12/2020</a:t>
+              <a:t>13-Dec-20</a:t>
             </a:fld>
             <a:endParaRPr lang="en-US"/>
           </a:p>
@@ -5902,7 +5846,7 @@
           <a:p>
             <a:fld id="{1D4DF9BF-9932-43C7-892F-C03C1335E0EA}" type="slidenum">
               <a:rPr lang="en-US" smtClean="0"/>
-              <a:t>‹#›</a:t>
+              <a:t>‹N°›</a:t>
             </a:fld>
             <a:endParaRPr lang="en-US"/>
           </a:p>
@@ -6470,7 +6414,7 @@
           <a:p>
             <a:fld id="{37199DC3-2230-41CD-8CF6-0CD3B14F7518}" type="datetimeFigureOut">
               <a:rPr lang="en-US" smtClean="0"/>
-              <a:t>12/12/2020</a:t>
+              <a:t>13-Dec-20</a:t>
             </a:fld>
             <a:endParaRPr lang="en-US"/>
           </a:p>
@@ -6512,7 +6456,7 @@
           <a:p>
             <a:fld id="{1D4DF9BF-9932-43C7-892F-C03C1335E0EA}" type="slidenum">
               <a:rPr lang="en-US" smtClean="0"/>
-              <a:t>‹#›</a:t>
+              <a:t>‹N°›</a:t>
             </a:fld>
             <a:endParaRPr lang="en-US"/>
           </a:p>
@@ -7317,7 +7261,7 @@
           <a:p>
             <a:fld id="{37199DC3-2230-41CD-8CF6-0CD3B14F7518}" type="datetimeFigureOut">
               <a:rPr lang="en-US" smtClean="0"/>
-              <a:t>12/12/2020</a:t>
+              <a:t>13-Dec-20</a:t>
             </a:fld>
             <a:endParaRPr lang="en-US"/>
           </a:p>
@@ -7359,7 +7303,7 @@
           <a:p>
             <a:fld id="{1D4DF9BF-9932-43C7-892F-C03C1335E0EA}" type="slidenum">
               <a:rPr lang="en-US" smtClean="0"/>
-              <a:t>‹#›</a:t>
+              <a:t>‹N°›</a:t>
             </a:fld>
             <a:endParaRPr lang="en-US"/>
           </a:p>
@@ -7492,7 +7436,7 @@
           <a:p>
             <a:fld id="{37199DC3-2230-41CD-8CF6-0CD3B14F7518}" type="datetimeFigureOut">
               <a:rPr lang="en-US" smtClean="0"/>
-              <a:t>12/12/2020</a:t>
+              <a:t>13-Dec-20</a:t>
             </a:fld>
             <a:endParaRPr lang="en-US"/>
           </a:p>
@@ -7534,7 +7478,7 @@
           <a:p>
             <a:fld id="{1D4DF9BF-9932-43C7-892F-C03C1335E0EA}" type="slidenum">
               <a:rPr lang="en-US" smtClean="0"/>
-              <a:t>‹#›</a:t>
+              <a:t>‹N°›</a:t>
             </a:fld>
             <a:endParaRPr lang="en-US"/>
           </a:p>
@@ -8490,7 +8434,7 @@
           <a:p>
             <a:fld id="{37199DC3-2230-41CD-8CF6-0CD3B14F7518}" type="datetimeFigureOut">
               <a:rPr lang="en-US" smtClean="0"/>
-              <a:t>12/12/2020</a:t>
+              <a:t>13-Dec-20</a:t>
             </a:fld>
             <a:endParaRPr lang="en-US"/>
           </a:p>
@@ -8568,7 +8512,7 @@
           <a:p>
             <a:fld id="{1D4DF9BF-9932-43C7-892F-C03C1335E0EA}" type="slidenum">
               <a:rPr lang="en-US" smtClean="0"/>
-              <a:t>‹#›</a:t>
+              <a:t>‹N°›</a:t>
             </a:fld>
             <a:endParaRPr lang="en-US"/>
           </a:p>
@@ -8696,7 +8640,7 @@
           <a:p>
             <a:fld id="{37199DC3-2230-41CD-8CF6-0CD3B14F7518}" type="datetimeFigureOut">
               <a:rPr lang="en-US" smtClean="0"/>
-              <a:t>12/12/2020</a:t>
+              <a:t>13-Dec-20</a:t>
             </a:fld>
             <a:endParaRPr lang="en-US"/>
           </a:p>
@@ -8738,7 +8682,7 @@
           <a:p>
             <a:fld id="{1D4DF9BF-9932-43C7-892F-C03C1335E0EA}" type="slidenum">
               <a:rPr lang="en-US" smtClean="0"/>
-              <a:t>‹#›</a:t>
+              <a:t>‹N°›</a:t>
             </a:fld>
             <a:endParaRPr lang="en-US"/>
           </a:p>
@@ -9758,7 +9702,7 @@
           <a:p>
             <a:fld id="{37199DC3-2230-41CD-8CF6-0CD3B14F7518}" type="datetimeFigureOut">
               <a:rPr lang="en-US" smtClean="0"/>
-              <a:t>12/12/2020</a:t>
+              <a:t>13-Dec-20</a:t>
             </a:fld>
             <a:endParaRPr lang="en-US"/>
           </a:p>
@@ -9836,7 +9780,7 @@
           <a:p>
             <a:fld id="{1D4DF9BF-9932-43C7-892F-C03C1335E0EA}" type="slidenum">
               <a:rPr lang="en-US" smtClean="0"/>
-              <a:t>‹#›</a:t>
+              <a:t>‹N°›</a:t>
             </a:fld>
             <a:endParaRPr lang="en-US"/>
           </a:p>
@@ -10030,7 +9974,7 @@
           <a:p>
             <a:fld id="{37199DC3-2230-41CD-8CF6-0CD3B14F7518}" type="datetimeFigureOut">
               <a:rPr lang="en-US" smtClean="0"/>
-              <a:t>12/12/2020</a:t>
+              <a:t>13-Dec-20</a:t>
             </a:fld>
             <a:endParaRPr lang="en-US"/>
           </a:p>
@@ -10072,7 +10016,7 @@
           <a:p>
             <a:fld id="{1D4DF9BF-9932-43C7-892F-C03C1335E0EA}" type="slidenum">
               <a:rPr lang="en-US" smtClean="0"/>
-              <a:t>‹#›</a:t>
+              <a:t>‹N°›</a:t>
             </a:fld>
             <a:endParaRPr lang="en-US"/>
           </a:p>
@@ -10412,7 +10356,7 @@
           <a:p>
             <a:fld id="{37199DC3-2230-41CD-8CF6-0CD3B14F7518}" type="datetimeFigureOut">
               <a:rPr lang="en-US" smtClean="0"/>
-              <a:t>12/12/2020</a:t>
+              <a:t>13-Dec-20</a:t>
             </a:fld>
             <a:endParaRPr lang="en-US"/>
           </a:p>
@@ -10454,7 +10398,7 @@
           <a:p>
             <a:fld id="{1D4DF9BF-9932-43C7-892F-C03C1335E0EA}" type="slidenum">
               <a:rPr lang="en-US" smtClean="0"/>
-              <a:t>‹#›</a:t>
+              <a:t>‹N°›</a:t>
             </a:fld>
             <a:endParaRPr lang="en-US"/>
           </a:p>
@@ -10530,7 +10474,7 @@
           <a:p>
             <a:fld id="{37199DC3-2230-41CD-8CF6-0CD3B14F7518}" type="datetimeFigureOut">
               <a:rPr lang="en-US" smtClean="0"/>
-              <a:t>12/12/2020</a:t>
+              <a:t>13-Dec-20</a:t>
             </a:fld>
             <a:endParaRPr lang="en-US"/>
           </a:p>
@@ -10572,7 +10516,7 @@
           <a:p>
             <a:fld id="{1D4DF9BF-9932-43C7-892F-C03C1335E0EA}" type="slidenum">
               <a:rPr lang="en-US" smtClean="0"/>
-              <a:t>‹#›</a:t>
+              <a:t>‹N°›</a:t>
             </a:fld>
             <a:endParaRPr lang="en-US"/>
           </a:p>
@@ -10625,7 +10569,7 @@
           <a:p>
             <a:fld id="{37199DC3-2230-41CD-8CF6-0CD3B14F7518}" type="datetimeFigureOut">
               <a:rPr lang="en-US" smtClean="0"/>
-              <a:t>12/12/2020</a:t>
+              <a:t>13-Dec-20</a:t>
             </a:fld>
             <a:endParaRPr lang="en-US"/>
           </a:p>
@@ -10703,7 +10647,7 @@
           <a:p>
             <a:fld id="{1D4DF9BF-9932-43C7-892F-C03C1335E0EA}" type="slidenum">
               <a:rPr lang="en-US" smtClean="0"/>
-              <a:t>‹#›</a:t>
+              <a:t>‹N°›</a:t>
             </a:fld>
             <a:endParaRPr lang="en-US"/>
           </a:p>
@@ -11734,7 +11678,7 @@
           <a:p>
             <a:fld id="{37199DC3-2230-41CD-8CF6-0CD3B14F7518}" type="datetimeFigureOut">
               <a:rPr lang="en-US" smtClean="0"/>
-              <a:t>12/12/2020</a:t>
+              <a:t>13-Dec-20</a:t>
             </a:fld>
             <a:endParaRPr lang="en-US"/>
           </a:p>
@@ -11812,7 +11756,7 @@
           <a:p>
             <a:fld id="{1D4DF9BF-9932-43C7-892F-C03C1335E0EA}" type="slidenum">
               <a:rPr lang="en-US" smtClean="0"/>
-              <a:t>‹#›</a:t>
+              <a:t>‹N°›</a:t>
             </a:fld>
             <a:endParaRPr lang="en-US"/>
           </a:p>
@@ -12867,7 +12811,7 @@
           <a:p>
             <a:fld id="{37199DC3-2230-41CD-8CF6-0CD3B14F7518}" type="datetimeFigureOut">
               <a:rPr lang="en-US" smtClean="0"/>
-              <a:t>12/12/2020</a:t>
+              <a:t>13-Dec-20</a:t>
             </a:fld>
             <a:endParaRPr lang="en-US"/>
           </a:p>
@@ -12945,7 +12889,7 @@
           <a:p>
             <a:fld id="{1D4DF9BF-9932-43C7-892F-C03C1335E0EA}" type="slidenum">
               <a:rPr lang="en-US" smtClean="0"/>
-              <a:t>‹#›</a:t>
+              <a:t>‹N°›</a:t>
             </a:fld>
             <a:endParaRPr lang="en-US"/>
           </a:p>
@@ -13895,7 +13839,7 @@
           <a:p>
             <a:fld id="{37199DC3-2230-41CD-8CF6-0CD3B14F7518}" type="datetimeFigureOut">
               <a:rPr lang="en-US" smtClean="0"/>
-              <a:t>12/12/2020</a:t>
+              <a:t>13-Dec-20</a:t>
             </a:fld>
             <a:endParaRPr lang="en-US"/>
           </a:p>
@@ -14007,7 +13951,7 @@
           <a:p>
             <a:fld id="{1D4DF9BF-9932-43C7-892F-C03C1335E0EA}" type="slidenum">
               <a:rPr lang="en-US" smtClean="0"/>
-              <a:t>‹#›</a:t>
+              <a:t>‹N°›</a:t>
             </a:fld>
             <a:endParaRPr lang="en-US"/>
           </a:p>
@@ -14590,38 +14534,29 @@
             <p:ph idx="1"/>
           </p:nvPr>
         </p:nvSpPr>
-        <p:spPr/>
+        <p:spPr>
+          <a:xfrm>
+            <a:off x="1154954" y="2603500"/>
+            <a:ext cx="10296147" cy="3445608"/>
+          </a:xfrm>
+        </p:spPr>
         <p:txBody>
-          <a:bodyPr/>
+          <a:bodyPr>
+            <a:normAutofit/>
+          </a:bodyPr>
           <a:lstStyle/>
           <a:p>
-            <a:r>
-              <a:rPr lang="en-US" dirty="0">
-                <a:latin typeface="Times New Roman" panose="02020603050405020304" pitchFamily="18" charset="0"/>
-                <a:cs typeface="Times New Roman" panose="02020603050405020304" pitchFamily="18" charset="0"/>
-              </a:rPr>
-              <a:t>The NB-BOW-FV is the one that perform better in terms of accuracy, Precision-No, Recall, F1 this is since its vocabulary contains “less random words” or words that are irrelevant.  However, LSTM model preforms better when it come to how precise to predict yes. Overall, the best model in term of all parameters is:</a:t>
-            </a:r>
-          </a:p>
-          <a:p>
-            <a:pPr marL="0" indent="0">
-              <a:buNone/>
-            </a:pPr>
-            <a:endParaRPr lang="en-US" dirty="0">
-              <a:latin typeface="Times New Roman" panose="02020603050405020304" pitchFamily="18" charset="0"/>
-              <a:cs typeface="Times New Roman" panose="02020603050405020304" pitchFamily="18" charset="0"/>
-            </a:endParaRPr>
-          </a:p>
-          <a:p>
-            <a:pPr marL="0" indent="0" algn="ctr">
-              <a:buNone/>
+            <a:pPr>
+              <a:lnSpc>
+                <a:spcPct val="200000"/>
+              </a:lnSpc>
             </a:pPr>
             <a:r>
               <a:rPr lang="en-US" dirty="0">
                 <a:latin typeface="Times New Roman" panose="02020603050405020304" pitchFamily="18" charset="0"/>
                 <a:cs typeface="Times New Roman" panose="02020603050405020304" pitchFamily="18" charset="0"/>
               </a:rPr>
-              <a:t>NB-BOW-FV &gt; NB-BOW-OV &gt; LSTM   </a:t>
+              <a:t>The NB-BOW-FV is producing better results than NB-BOW-OV in term of  Precision, Recall, and F1. As for the LSTM model, our LSTM 1 is the most noticeable one among the 3 times we ran this model. We noticed also that results for our scores keep changing every time that we run the code. As for the LSTM model vs the NB-BOW-FV although they seem almost on equal term. I think the LSTM has the potential of surpassing potential of surpassing the NB-BOW-FV given that every iteration is keeping, deleting and outputting the correct output.  </a:t>
             </a:r>
           </a:p>
         </p:txBody>
@@ -17410,10 +17345,10 @@
       </p:sp>
       <p:graphicFrame>
         <p:nvGraphicFramePr>
-          <p:cNvPr id="5" name="Graphique 4">
+          <p:cNvPr id="4" name="Graphique 3">
             <a:extLst>
               <a:ext uri="{FF2B5EF4-FFF2-40B4-BE49-F238E27FC236}">
-                <a16:creationId xmlns:a16="http://schemas.microsoft.com/office/drawing/2014/main" id="{7996D5F0-C1DC-4D07-89C2-1E79B36204F8}"/>
+                <a16:creationId xmlns:a16="http://schemas.microsoft.com/office/drawing/2014/main" id="{856F8E41-127F-49AB-8841-8D8D809E182E}"/>
               </a:ext>
             </a:extLst>
           </p:cNvPr>
@@ -17421,14 +17356,14 @@
           <p:nvPr>
             <p:extLst>
               <p:ext uri="{D42A27DB-BD31-4B8C-83A1-F6EECF244321}">
-                <p14:modId xmlns:p14="http://schemas.microsoft.com/office/powerpoint/2010/main" val="1384013813"/>
+                <p14:modId xmlns:p14="http://schemas.microsoft.com/office/powerpoint/2010/main" val="3308691857"/>
               </p:ext>
             </p:extLst>
           </p:nvPr>
         </p:nvGraphicFramePr>
         <p:xfrm>
-          <a:off x="516194" y="2057400"/>
-          <a:ext cx="11090787" cy="4358148"/>
+          <a:off x="503583" y="2057400"/>
+          <a:ext cx="11158329" cy="4210878"/>
         </p:xfrm>
         <a:graphic>
           <a:graphicData uri="http://schemas.openxmlformats.org/drawingml/2006/chart">
@@ -17595,10 +17530,10 @@
       </p:sp>
       <p:graphicFrame>
         <p:nvGraphicFramePr>
-          <p:cNvPr id="4" name="Graphique 3">
+          <p:cNvPr id="6" name="Graphique 5">
             <a:extLst>
               <a:ext uri="{FF2B5EF4-FFF2-40B4-BE49-F238E27FC236}">
-                <a16:creationId xmlns:a16="http://schemas.microsoft.com/office/drawing/2014/main" id="{8F58F948-6799-48AC-A775-35EF45280AEF}"/>
+                <a16:creationId xmlns:a16="http://schemas.microsoft.com/office/drawing/2014/main" id="{E5E646A4-62E4-45F5-9939-FDCA4FE0E60F}"/>
               </a:ext>
             </a:extLst>
           </p:cNvPr>
@@ -17606,14 +17541,14 @@
           <p:nvPr>
             <p:extLst>
               <p:ext uri="{D42A27DB-BD31-4B8C-83A1-F6EECF244321}">
-                <p14:modId xmlns:p14="http://schemas.microsoft.com/office/powerpoint/2010/main" val="2669514549"/>
+                <p14:modId xmlns:p14="http://schemas.microsoft.com/office/powerpoint/2010/main" val="3929125958"/>
               </p:ext>
             </p:extLst>
           </p:nvPr>
         </p:nvGraphicFramePr>
         <p:xfrm>
-          <a:off x="571500" y="2381477"/>
-          <a:ext cx="10972799" cy="3882682"/>
+          <a:off x="575187" y="2057399"/>
+          <a:ext cx="11297945" cy="4315266"/>
         </p:xfrm>
         <a:graphic>
           <a:graphicData uri="http://schemas.openxmlformats.org/drawingml/2006/chart">

</xml_diff>

<commit_message>
Fixing ppt some slides
</commit_message>
<xml_diff>
--- a/Tutorial-3-Presentation.pptx
+++ b/Tutorial-3-Presentation.pptx
@@ -16337,7 +16337,7 @@
           <p:nvPr>
             <p:extLst>
               <p:ext uri="{D42A27DB-BD31-4B8C-83A1-F6EECF244321}">
-                <p14:modId xmlns:p14="http://schemas.microsoft.com/office/powerpoint/2010/main" val="802588931"/>
+                <p14:modId xmlns:p14="http://schemas.microsoft.com/office/powerpoint/2010/main" val="810778115"/>
               </p:ext>
             </p:extLst>
           </p:nvPr>
@@ -16510,7 +16510,7 @@
                       <a:pPr algn="r"/>
                       <a:r>
                         <a:rPr lang="en-US" dirty="0"/>
-                        <a:t>70.37%</a:t>
+                        <a:t>78.18%</a:t>
                       </a:r>
                     </a:p>
                   </a:txBody>
@@ -16524,7 +16524,7 @@
                       <a:pPr algn="r"/>
                       <a:r>
                         <a:rPr lang="en-US" dirty="0"/>
-                        <a:t>81.48%</a:t>
+                        <a:t>78.38%</a:t>
                       </a:r>
                     </a:p>
                   </a:txBody>
@@ -16538,7 +16538,7 @@
                       <a:pPr algn="r"/>
                       <a:r>
                         <a:rPr lang="en-US" dirty="0"/>
-                        <a:t>18.52%</a:t>
+                        <a:t>77.78%</a:t>
                       </a:r>
                     </a:p>
                   </a:txBody>
@@ -16552,7 +16552,7 @@
                       <a:pPr algn="r"/>
                       <a:r>
                         <a:rPr lang="en-US" dirty="0"/>
-                        <a:t>66.67%</a:t>
+                        <a:t>87.88%</a:t>
                       </a:r>
                     </a:p>
                   </a:txBody>
@@ -16566,7 +16566,7 @@
                       <a:pPr algn="r"/>
                       <a:r>
                         <a:rPr lang="en-US" dirty="0"/>
-                        <a:t>23.81%</a:t>
+                        <a:t>63.64%</a:t>
                       </a:r>
                     </a:p>
                   </a:txBody>
@@ -16580,7 +16580,7 @@
                       <a:pPr algn="r"/>
                       <a:r>
                         <a:rPr lang="en-US" dirty="0"/>
-                        <a:t>73.33%</a:t>
+                        <a:t>82.86%</a:t>
                       </a:r>
                     </a:p>
                   </a:txBody>
@@ -16594,7 +16594,7 @@
                       <a:pPr algn="r"/>
                       <a:r>
                         <a:rPr lang="en-US" dirty="0"/>
-                        <a:t>20.83%</a:t>
+                        <a:t>70%</a:t>
                       </a:r>
                     </a:p>
                   </a:txBody>
@@ -16625,7 +16625,7 @@
           <p:nvPr>
             <p:extLst>
               <p:ext uri="{D42A27DB-BD31-4B8C-83A1-F6EECF244321}">
-                <p14:modId xmlns:p14="http://schemas.microsoft.com/office/powerpoint/2010/main" val="1652244119"/>
+                <p14:modId xmlns:p14="http://schemas.microsoft.com/office/powerpoint/2010/main" val="2781745625"/>
               </p:ext>
             </p:extLst>
           </p:nvPr>
@@ -16805,7 +16805,7 @@
                           <a:ea typeface="+mn-ea"/>
                           <a:cs typeface="+mn-cs"/>
                         </a:rPr>
-                        <a:t>75.93%</a:t>
+                        <a:t>72.73%</a:t>
                       </a:r>
                     </a:p>
                   </a:txBody>
@@ -16826,7 +16826,7 @@
                           <a:ea typeface="+mn-ea"/>
                           <a:cs typeface="+mn-cs"/>
                         </a:rPr>
-                        <a:t>77.78%</a:t>
+                        <a:t>71.43%</a:t>
                       </a:r>
                     </a:p>
                   </a:txBody>
@@ -16847,7 +16847,7 @@
                           <a:ea typeface="+mn-ea"/>
                           <a:cs typeface="+mn-cs"/>
                         </a:rPr>
-                        <a:t>22.22%</a:t>
+                        <a:t>76.92%</a:t>
                       </a:r>
                     </a:p>
                   </a:txBody>
@@ -16868,7 +16868,7 @@
                           <a:ea typeface="+mn-ea"/>
                           <a:cs typeface="+mn-cs"/>
                         </a:rPr>
-                        <a:t>84.85%</a:t>
+                        <a:t>90.91%</a:t>
                       </a:r>
                     </a:p>
                   </a:txBody>
@@ -16889,7 +16889,7 @@
                           <a:ea typeface="+mn-ea"/>
                           <a:cs typeface="+mn-cs"/>
                         </a:rPr>
-                        <a:t>38.1%</a:t>
+                        <a:t>45.45%</a:t>
                       </a:r>
                     </a:p>
                   </a:txBody>
@@ -16910,7 +16910,7 @@
                           <a:ea typeface="+mn-ea"/>
                           <a:cs typeface="+mn-cs"/>
                         </a:rPr>
-                        <a:t>81.16%</a:t>
+                        <a:t>80%</a:t>
                       </a:r>
                     </a:p>
                   </a:txBody>
@@ -16931,7 +16931,7 @@
                           <a:ea typeface="+mn-ea"/>
                           <a:cs typeface="+mn-cs"/>
                         </a:rPr>
-                        <a:t>28.07%</a:t>
+                        <a:t>57.14%</a:t>
                       </a:r>
                     </a:p>
                   </a:txBody>
@@ -16962,7 +16962,7 @@
           <p:nvPr>
             <p:extLst>
               <p:ext uri="{D42A27DB-BD31-4B8C-83A1-F6EECF244321}">
-                <p14:modId xmlns:p14="http://schemas.microsoft.com/office/powerpoint/2010/main" val="3825345651"/>
+                <p14:modId xmlns:p14="http://schemas.microsoft.com/office/powerpoint/2010/main" val="1999993114"/>
               </p:ext>
             </p:extLst>
           </p:nvPr>
@@ -17142,7 +17142,7 @@
                           <a:ea typeface="+mn-ea"/>
                           <a:cs typeface="+mn-cs"/>
                         </a:rPr>
-                        <a:t>61.11%</a:t>
+                        <a:t>60%</a:t>
                       </a:r>
                     </a:p>
                   </a:txBody>
@@ -17163,7 +17163,7 @@
                           <a:ea typeface="+mn-ea"/>
                           <a:cs typeface="+mn-cs"/>
                         </a:rPr>
-                        <a:t>70%</a:t>
+                        <a:t>61.17%</a:t>
                       </a:r>
                     </a:p>
                   </a:txBody>
@@ -17184,7 +17184,7 @@
                           <a:ea typeface="+mn-ea"/>
                           <a:cs typeface="+mn-cs"/>
                         </a:rPr>
-                        <a:t>30%</a:t>
+                        <a:t>50%</a:t>
                       </a:r>
                     </a:p>
                   </a:txBody>
@@ -17205,7 +17205,7 @@
                           <a:ea typeface="+mn-ea"/>
                           <a:cs typeface="+mn-cs"/>
                         </a:rPr>
-                        <a:t>63.64%</a:t>
+                        <a:t>87.88%</a:t>
                       </a:r>
                     </a:p>
                   </a:txBody>
@@ -17226,7 +17226,7 @@
                           <a:ea typeface="+mn-ea"/>
                           <a:cs typeface="+mn-cs"/>
                         </a:rPr>
-                        <a:t>42.86%</a:t>
+                        <a:t>18.18%</a:t>
                       </a:r>
                     </a:p>
                   </a:txBody>
@@ -17247,7 +17247,7 @@
                           <a:ea typeface="+mn-ea"/>
                           <a:cs typeface="+mn-cs"/>
                         </a:rPr>
-                        <a:t>66.67%</a:t>
+                        <a:t>72.5%</a:t>
                       </a:r>
                     </a:p>
                   </a:txBody>
@@ -17268,7 +17268,7 @@
                           <a:ea typeface="+mn-ea"/>
                           <a:cs typeface="+mn-cs"/>
                         </a:rPr>
-                        <a:t>35.29%</a:t>
+                        <a:t>26.67%</a:t>
                       </a:r>
                     </a:p>
                   </a:txBody>
@@ -17463,7 +17463,7 @@
                 <a:latin typeface="Times New Roman" panose="02020603050405020304" pitchFamily="18" charset="0"/>
                 <a:cs typeface="Times New Roman" panose="02020603050405020304" pitchFamily="18" charset="0"/>
               </a:rPr>
-              <a:t>The results generated by the LSTM differ significantly from one run to the other. Some runs have high accuracy and other have high Precision. We can’t presently explain this discrepancy.</a:t>
+              <a:t>The results generated by the LSTM differ significantly from one run to another other. Some runs have high accuracy and other have high Precision. We can’t presently explain this discrepancy.</a:t>
             </a:r>
           </a:p>
         </p:txBody>

</xml_diff>